<commit_message>
add data examples for test designs
</commit_message>
<xml_diff>
--- a/slides/Tag2_1Vormittag_Nr2_Testdesigns/Testdesigns.pptx
+++ b/slides/Tag2_1Vormittag_Nr2_Testdesigns/Testdesigns.pptx
@@ -327,7 +327,7 @@
               <a:pPr>
                 <a:defRPr/>
               </a:pPr>
-              <a:t>23.09.2024</a:t>
+              <a:t>26.09.2024</a:t>
             </a:fld>
             <a:endParaRPr lang="de-DE"/>
           </a:p>
@@ -525,7 +525,7 @@
               <a:pPr>
                 <a:defRPr/>
               </a:pPr>
-              <a:t>23.09.2024</a:t>
+              <a:t>26.09.2024</a:t>
             </a:fld>
             <a:endParaRPr lang="de-DE"/>
           </a:p>
@@ -10521,7 +10521,7 @@
               <a:pPr>
                 <a:defRPr/>
               </a:pPr>
-              <a:t>23.09.2024</a:t>
+              <a:t>26.09.2024</a:t>
             </a:fld>
             <a:endParaRPr lang="de-DE" dirty="0"/>
           </a:p>
@@ -23397,7 +23397,7 @@
           <a:graphicData uri="http://schemas.openxmlformats.org/presentationml/2006/ole">
             <mc:AlternateContent xmlns:mc="http://schemas.openxmlformats.org/markup-compatibility/2006">
               <mc:Choice xmlns:v="urn:schemas-microsoft-com:vml" Requires="v">
-                <p:oleObj spid="_x0000_s263292" r:id="rId4" imgW="1346200" imgH="431800" progId="Equation.3">
+                <p:oleObj spid="_x0000_s263296" r:id="rId4" imgW="1346200" imgH="431800" progId="Equation.3">
                   <p:embed/>
                 </p:oleObj>
               </mc:Choice>
@@ -23548,7 +23548,7 @@
           <a:graphicData uri="http://schemas.openxmlformats.org/presentationml/2006/ole">
             <mc:AlternateContent xmlns:mc="http://schemas.openxmlformats.org/markup-compatibility/2006">
               <mc:Choice xmlns:v="urn:schemas-microsoft-com:vml" Requires="v">
-                <p:oleObj spid="_x0000_s263293" r:id="rId6" imgW="1218671" imgH="215806" progId="Equation.3">
+                <p:oleObj spid="_x0000_s263297" r:id="rId6" imgW="1218671" imgH="215806" progId="Equation.3">
                   <p:embed/>
                 </p:oleObj>
               </mc:Choice>
@@ -26554,7 +26554,7 @@
           <a:graphicData uri="http://schemas.openxmlformats.org/presentationml/2006/ole">
             <mc:AlternateContent xmlns:mc="http://schemas.openxmlformats.org/markup-compatibility/2006">
               <mc:Choice xmlns:v="urn:schemas-microsoft-com:vml" Requires="v">
-                <p:oleObj spid="_x0000_s354328" r:id="rId4" imgW="1040948" imgH="228501" progId="Equation.3">
+                <p:oleObj spid="_x0000_s354332" r:id="rId4" imgW="1040948" imgH="228501" progId="Equation.3">
                   <p:embed/>
                 </p:oleObj>
               </mc:Choice>
@@ -26636,7 +26636,7 @@
           <a:graphicData uri="http://schemas.openxmlformats.org/presentationml/2006/ole">
             <mc:AlternateContent xmlns:mc="http://schemas.openxmlformats.org/markup-compatibility/2006">
               <mc:Choice xmlns:v="urn:schemas-microsoft-com:vml" Requires="v">
-                <p:oleObj spid="_x0000_s354329" name="Formel" r:id="rId6" imgW="1638300" imgH="228600" progId="Equation.3">
+                <p:oleObj spid="_x0000_s354333" name="Formel" r:id="rId6" imgW="1638300" imgH="228600" progId="Equation.3">
                   <p:embed/>
                 </p:oleObj>
               </mc:Choice>
@@ -28919,7 +28919,7 @@
           <a:graphicData uri="http://schemas.openxmlformats.org/presentationml/2006/ole">
             <mc:AlternateContent xmlns:mc="http://schemas.openxmlformats.org/markup-compatibility/2006">
               <mc:Choice xmlns:v="urn:schemas-microsoft-com:vml" Requires="v">
-                <p:oleObj spid="_x0000_s336931" name="Formel" r:id="rId5" imgW="1638300" imgH="228600" progId="Equation.3">
+                <p:oleObj spid="_x0000_s336933" name="Formel" r:id="rId5" imgW="1638300" imgH="228600" progId="Equation.3">
                   <p:embed/>
                 </p:oleObj>
               </mc:Choice>
@@ -30931,7 +30931,7 @@
           <a:graphicData uri="http://schemas.openxmlformats.org/presentationml/2006/ole">
             <mc:AlternateContent xmlns:mc="http://schemas.openxmlformats.org/markup-compatibility/2006">
               <mc:Choice xmlns:v="urn:schemas-microsoft-com:vml" Requires="v">
-                <p:oleObj spid="_x0000_s339033" name="Formel" r:id="rId4" imgW="1650960" imgH="228600" progId="Equation.3">
+                <p:oleObj spid="_x0000_s339039" name="Formel" r:id="rId4" imgW="1650960" imgH="228600" progId="Equation.3">
                   <p:embed/>
                 </p:oleObj>
               </mc:Choice>
@@ -31014,7 +31014,7 @@
           <a:graphicData uri="http://schemas.openxmlformats.org/presentationml/2006/ole">
             <mc:AlternateContent xmlns:mc="http://schemas.openxmlformats.org/markup-compatibility/2006">
               <mc:Choice xmlns:v="urn:schemas-microsoft-com:vml" Requires="v">
-                <p:oleObj spid="_x0000_s339034" name="Formel" r:id="rId6" imgW="1041120" imgH="215640" progId="Equation.3">
+                <p:oleObj spid="_x0000_s339040" name="Formel" r:id="rId6" imgW="1041120" imgH="215640" progId="Equation.3">
                   <p:embed/>
                 </p:oleObj>
               </mc:Choice>
@@ -31097,7 +31097,7 @@
           <a:graphicData uri="http://schemas.openxmlformats.org/presentationml/2006/ole">
             <mc:AlternateContent xmlns:mc="http://schemas.openxmlformats.org/markup-compatibility/2006">
               <mc:Choice xmlns:v="urn:schemas-microsoft-com:vml" Requires="v">
-                <p:oleObj spid="_x0000_s339035" name="Formel" r:id="rId8" imgW="2628720" imgH="241200" progId="Equation.3">
+                <p:oleObj spid="_x0000_s339041" name="Formel" r:id="rId8" imgW="2628720" imgH="241200" progId="Equation.3">
                   <p:embed/>
                 </p:oleObj>
               </mc:Choice>
@@ -40413,93 +40413,6 @@
               <a:t>Designfaktoren Block und Testheft sind idealerweise balanciert </a:t>
             </a:r>
           </a:p>
-          <a:p>
-            <a:pPr lvl="1">
-              <a:lnSpc>
-                <a:spcPct val="114000"/>
-              </a:lnSpc>
-              <a:spcBef>
-                <a:spcPts val="600"/>
-              </a:spcBef>
-              <a:buClr>
-                <a:srgbClr val="A61B1E"/>
-              </a:buClr>
-              <a:buFontTx/>
-              <a:buChar char="–"/>
-            </a:pPr>
-            <a:r>
-              <a:rPr lang="de-DE" altLang="de-DE" sz="1400" dirty="0">
-                <a:latin typeface="Calibri" pitchFamily="34" charset="0"/>
-              </a:rPr>
-              <a:t>„schlechte“ Testdesign bewirken, dass zu den ohnehin restriktiven Annahmen des Raschmodells zusätzliche und </a:t>
-            </a:r>
-            <a:r>
-              <a:rPr lang="de-DE" altLang="de-DE" sz="1400" b="1" dirty="0">
-                <a:latin typeface="Calibri" pitchFamily="34" charset="0"/>
-              </a:rPr>
-              <a:t>nicht testbare</a:t>
-            </a:r>
-            <a:r>
-              <a:rPr lang="de-DE" altLang="de-DE" sz="1400" dirty="0">
-                <a:latin typeface="Calibri" pitchFamily="34" charset="0"/>
-              </a:rPr>
-              <a:t> Annahmen hinzukommen, die als gegeben gelten müssen, damit die Parameter sinnvoll interpretiert werden können</a:t>
-            </a:r>
-          </a:p>
-          <a:p>
-            <a:pPr lvl="1">
-              <a:lnSpc>
-                <a:spcPct val="114000"/>
-              </a:lnSpc>
-              <a:spcBef>
-                <a:spcPts val="600"/>
-              </a:spcBef>
-              <a:buClr>
-                <a:srgbClr val="A61B1E"/>
-              </a:buClr>
-              <a:buFontTx/>
-              <a:buChar char="–"/>
-            </a:pPr>
-            <a:r>
-              <a:rPr lang="de-DE" altLang="de-DE" sz="1400" dirty="0">
-                <a:latin typeface="Calibri" pitchFamily="34" charset="0"/>
-              </a:rPr>
-              <a:t>„Gute“ Testdesigns minimieren die Anzahl dieser zusätzlichen, durch sie implizierten und nicht testbaren Annahmen</a:t>
-            </a:r>
-            <a:endParaRPr lang="en-US" altLang="de-DE" sz="1400" dirty="0">
-              <a:latin typeface="Calibri" pitchFamily="34" charset="0"/>
-            </a:endParaRPr>
-          </a:p>
-          <a:p>
-            <a:pPr marL="285750" indent="-285750">
-              <a:lnSpc>
-                <a:spcPct val="114000"/>
-              </a:lnSpc>
-              <a:spcBef>
-                <a:spcPts val="600"/>
-              </a:spcBef>
-              <a:buFont typeface="Arial" panose="020B0604020202020204" pitchFamily="34" charset="0"/>
-              <a:buChar char="•"/>
-            </a:pPr>
-            <a:r>
-              <a:rPr lang="en-US" altLang="de-DE" sz="1800" dirty="0">
-                <a:solidFill>
-                  <a:srgbClr val="8E0000"/>
-                </a:solidFill>
-                <a:latin typeface="Calibri" pitchFamily="34" charset="0"/>
-              </a:rPr>
-              <a:t>“You can’t fix by analysis what you bungled by design” </a:t>
-            </a:r>
-            <a:r>
-              <a:rPr lang="en-US" altLang="de-DE" sz="1200" dirty="0">
-                <a:solidFill>
-                  <a:srgbClr val="8E0000"/>
-                </a:solidFill>
-                <a:latin typeface="Calibri" pitchFamily="34" charset="0"/>
-              </a:rPr>
-              <a:t>(Light, Singer, and Willet, 1990)</a:t>
-            </a:r>
-          </a:p>
         </p:txBody>
       </p:sp>
     </p:spTree>
@@ -40844,153 +40757,6 @@
                                           <p:spTgt spid="4">
                                             <p:txEl>
                                               <p:pRg st="6" end="6"/>
-                                            </p:txEl>
-                                          </p:spTgt>
-                                        </p:tgtEl>
-                                        <p:attrNameLst>
-                                          <p:attrName>style.visibility</p:attrName>
-                                        </p:attrNameLst>
-                                      </p:cBhvr>
-                                      <p:to>
-                                        <p:strVal val="visible"/>
-                                      </p:to>
-                                    </p:set>
-                                  </p:childTnLst>
-                                </p:cTn>
-                              </p:par>
-                            </p:childTnLst>
-                          </p:cTn>
-                        </p:par>
-                      </p:childTnLst>
-                    </p:cTn>
-                  </p:par>
-                  <p:par>
-                    <p:cTn id="31" fill="hold">
-                      <p:stCondLst>
-                        <p:cond delay="indefinite"/>
-                      </p:stCondLst>
-                      <p:childTnLst>
-                        <p:par>
-                          <p:cTn id="32" fill="hold">
-                            <p:stCondLst>
-                              <p:cond delay="0"/>
-                            </p:stCondLst>
-                            <p:childTnLst>
-                              <p:par>
-                                <p:cTn id="33" presetID="1" presetClass="entr" presetSubtype="0" fill="hold" nodeType="clickEffect">
-                                  <p:stCondLst>
-                                    <p:cond delay="0"/>
-                                  </p:stCondLst>
-                                  <p:childTnLst>
-                                    <p:set>
-                                      <p:cBhvr>
-                                        <p:cTn id="34" dur="1" fill="hold">
-                                          <p:stCondLst>
-                                            <p:cond delay="0"/>
-                                          </p:stCondLst>
-                                        </p:cTn>
-                                        <p:tgtEl>
-                                          <p:spTgt spid="4">
-                                            <p:txEl>
-                                              <p:pRg st="7" end="7"/>
-                                            </p:txEl>
-                                          </p:spTgt>
-                                        </p:tgtEl>
-                                        <p:attrNameLst>
-                                          <p:attrName>style.visibility</p:attrName>
-                                        </p:attrNameLst>
-                                      </p:cBhvr>
-                                      <p:to>
-                                        <p:strVal val="visible"/>
-                                      </p:to>
-                                    </p:set>
-                                  </p:childTnLst>
-                                </p:cTn>
-                              </p:par>
-                            </p:childTnLst>
-                          </p:cTn>
-                        </p:par>
-                      </p:childTnLst>
-                    </p:cTn>
-                  </p:par>
-                  <p:par>
-                    <p:cTn id="35" fill="hold">
-                      <p:stCondLst>
-                        <p:cond delay="indefinite"/>
-                      </p:stCondLst>
-                      <p:childTnLst>
-                        <p:par>
-                          <p:cTn id="36" fill="hold">
-                            <p:stCondLst>
-                              <p:cond delay="0"/>
-                            </p:stCondLst>
-                            <p:childTnLst>
-                              <p:par>
-                                <p:cTn id="37" presetID="1" presetClass="entr" presetSubtype="0" fill="hold" nodeType="clickEffect">
-                                  <p:stCondLst>
-                                    <p:cond delay="0"/>
-                                  </p:stCondLst>
-                                  <p:childTnLst>
-                                    <p:set>
-                                      <p:cBhvr>
-                                        <p:cTn id="38" dur="1" fill="hold">
-                                          <p:stCondLst>
-                                            <p:cond delay="0"/>
-                                          </p:stCondLst>
-                                        </p:cTn>
-                                        <p:tgtEl>
-                                          <p:spTgt spid="4">
-                                            <p:txEl>
-                                              <p:pRg st="8" end="8"/>
-                                            </p:txEl>
-                                          </p:spTgt>
-                                        </p:tgtEl>
-                                        <p:attrNameLst>
-                                          <p:attrName>style.visibility</p:attrName>
-                                        </p:attrNameLst>
-                                      </p:cBhvr>
-                                      <p:to>
-                                        <p:strVal val="visible"/>
-                                      </p:to>
-                                    </p:set>
-                                  </p:childTnLst>
-                                </p:cTn>
-                              </p:par>
-                            </p:childTnLst>
-                          </p:cTn>
-                        </p:par>
-                      </p:childTnLst>
-                    </p:cTn>
-                  </p:par>
-                  <p:par>
-                    <p:cTn id="39" fill="hold">
-                      <p:stCondLst>
-                        <p:cond delay="indefinite"/>
-                      </p:stCondLst>
-                      <p:childTnLst>
-                        <p:par>
-                          <p:cTn id="40" fill="hold">
-                            <p:stCondLst>
-                              <p:cond delay="0"/>
-                            </p:stCondLst>
-                            <p:childTnLst>
-                              <p:par>
-                                <p:cTn id="41" presetID="1" presetClass="entr" presetSubtype="0" fill="hold" nodeType="clickEffect">
-                                  <p:stCondLst>
-                                    <p:cond delay="0"/>
-                                  </p:stCondLst>
-                                  <p:childTnLst>
-                                    <p:set>
-                                      <p:cBhvr>
-                                        <p:cTn id="42" dur="1" fill="hold">
-                                          <p:stCondLst>
-                                            <p:cond delay="0"/>
-                                          </p:stCondLst>
-                                        </p:cTn>
-                                        <p:tgtEl>
-                                          <p:spTgt spid="4">
-                                            <p:txEl>
-                                              <p:pRg st="9" end="9"/>
                                             </p:txEl>
                                           </p:spTgt>
                                         </p:tgtEl>

</xml_diff>